<commit_message>
Update table sample in README
</commit_message>
<xml_diff>
--- a/ShapeCrawler.Tests.Unit/Resource/006_1 slides.pptx
+++ b/ShapeCrawler.Tests.Unit/Resource/006_1 slides.pptx
@@ -9,6 +9,13 @@
   </p:sldIdLst>
   <p:sldSz cx="12192000" cy="6858000"/>
   <p:notesSz cx="6858000" cy="9144000"/>
+  <p:custShowLst>
+    <p:custShow name="Custom Show 1" id="0">
+      <p:sldLst>
+        <p:sld r:id="rId2"/>
+      </p:sldLst>
+    </p:custShow>
+  </p:custShowLst>
   <p:defaultTextStyle>
     <a:defPPr>
       <a:defRPr lang="en-US"/>
@@ -261,7 +268,7 @@
           <a:p>
             <a:fld id="{2638AAA8-BCC5-4F10-BE49-E27B80A547D2}" type="datetimeFigureOut">
               <a:rPr lang="en-US" smtClean="0"/>
-              <a:t>3/18/2020</a:t>
+              <a:t>2/13/2021</a:t>
             </a:fld>
             <a:endParaRPr lang="en-US"/>
           </a:p>
@@ -461,7 +468,7 @@
           <a:p>
             <a:fld id="{2638AAA8-BCC5-4F10-BE49-E27B80A547D2}" type="datetimeFigureOut">
               <a:rPr lang="en-US" smtClean="0"/>
-              <a:t>3/18/2020</a:t>
+              <a:t>2/13/2021</a:t>
             </a:fld>
             <a:endParaRPr lang="en-US"/>
           </a:p>
@@ -671,7 +678,7 @@
           <a:p>
             <a:fld id="{2638AAA8-BCC5-4F10-BE49-E27B80A547D2}" type="datetimeFigureOut">
               <a:rPr lang="en-US" smtClean="0"/>
-              <a:t>3/18/2020</a:t>
+              <a:t>2/13/2021</a:t>
             </a:fld>
             <a:endParaRPr lang="en-US"/>
           </a:p>
@@ -871,7 +878,7 @@
           <a:p>
             <a:fld id="{2638AAA8-BCC5-4F10-BE49-E27B80A547D2}" type="datetimeFigureOut">
               <a:rPr lang="en-US" smtClean="0"/>
-              <a:t>3/18/2020</a:t>
+              <a:t>2/13/2021</a:t>
             </a:fld>
             <a:endParaRPr lang="en-US"/>
           </a:p>
@@ -1147,7 +1154,7 @@
           <a:p>
             <a:fld id="{2638AAA8-BCC5-4F10-BE49-E27B80A547D2}" type="datetimeFigureOut">
               <a:rPr lang="en-US" smtClean="0"/>
-              <a:t>3/18/2020</a:t>
+              <a:t>2/13/2021</a:t>
             </a:fld>
             <a:endParaRPr lang="en-US"/>
           </a:p>
@@ -1415,7 +1422,7 @@
           <a:p>
             <a:fld id="{2638AAA8-BCC5-4F10-BE49-E27B80A547D2}" type="datetimeFigureOut">
               <a:rPr lang="en-US" smtClean="0"/>
-              <a:t>3/18/2020</a:t>
+              <a:t>2/13/2021</a:t>
             </a:fld>
             <a:endParaRPr lang="en-US"/>
           </a:p>
@@ -1830,7 +1837,7 @@
           <a:p>
             <a:fld id="{2638AAA8-BCC5-4F10-BE49-E27B80A547D2}" type="datetimeFigureOut">
               <a:rPr lang="en-US" smtClean="0"/>
-              <a:t>3/18/2020</a:t>
+              <a:t>2/13/2021</a:t>
             </a:fld>
             <a:endParaRPr lang="en-US"/>
           </a:p>
@@ -1972,7 +1979,7 @@
           <a:p>
             <a:fld id="{2638AAA8-BCC5-4F10-BE49-E27B80A547D2}" type="datetimeFigureOut">
               <a:rPr lang="en-US" smtClean="0"/>
-              <a:t>3/18/2020</a:t>
+              <a:t>2/13/2021</a:t>
             </a:fld>
             <a:endParaRPr lang="en-US"/>
           </a:p>
@@ -2085,7 +2092,7 @@
           <a:p>
             <a:fld id="{2638AAA8-BCC5-4F10-BE49-E27B80A547D2}" type="datetimeFigureOut">
               <a:rPr lang="en-US" smtClean="0"/>
-              <a:t>3/18/2020</a:t>
+              <a:t>2/13/2021</a:t>
             </a:fld>
             <a:endParaRPr lang="en-US"/>
           </a:p>
@@ -2398,7 +2405,7 @@
           <a:p>
             <a:fld id="{2638AAA8-BCC5-4F10-BE49-E27B80A547D2}" type="datetimeFigureOut">
               <a:rPr lang="en-US" smtClean="0"/>
-              <a:t>3/18/2020</a:t>
+              <a:t>2/13/2021</a:t>
             </a:fld>
             <a:endParaRPr lang="en-US"/>
           </a:p>
@@ -2687,7 +2694,7 @@
           <a:p>
             <a:fld id="{2638AAA8-BCC5-4F10-BE49-E27B80A547D2}" type="datetimeFigureOut">
               <a:rPr lang="en-US" smtClean="0"/>
-              <a:t>3/18/2020</a:t>
+              <a:t>2/13/2021</a:t>
             </a:fld>
             <a:endParaRPr lang="en-US"/>
           </a:p>
@@ -2930,7 +2937,7 @@
           <a:p>
             <a:fld id="{2638AAA8-BCC5-4F10-BE49-E27B80A547D2}" type="datetimeFigureOut">
               <a:rPr lang="en-US" smtClean="0"/>
-              <a:t>3/18/2020</a:t>
+              <a:t>2/13/2021</a:t>
             </a:fld>
             <a:endParaRPr lang="en-US"/>
           </a:p>

</xml_diff>

<commit_message>
Update table sample in README (#106)
</commit_message>
<xml_diff>
--- a/ShapeCrawler.Tests.Unit/Resource/006_1 slides.pptx
+++ b/ShapeCrawler.Tests.Unit/Resource/006_1 slides.pptx
@@ -9,6 +9,13 @@
   </p:sldIdLst>
   <p:sldSz cx="12192000" cy="6858000"/>
   <p:notesSz cx="6858000" cy="9144000"/>
+  <p:custShowLst>
+    <p:custShow name="Custom Show 1" id="0">
+      <p:sldLst>
+        <p:sld r:id="rId2"/>
+      </p:sldLst>
+    </p:custShow>
+  </p:custShowLst>
   <p:defaultTextStyle>
     <a:defPPr>
       <a:defRPr lang="en-US"/>
@@ -261,7 +268,7 @@
           <a:p>
             <a:fld id="{2638AAA8-BCC5-4F10-BE49-E27B80A547D2}" type="datetimeFigureOut">
               <a:rPr lang="en-US" smtClean="0"/>
-              <a:t>3/18/2020</a:t>
+              <a:t>2/13/2021</a:t>
             </a:fld>
             <a:endParaRPr lang="en-US"/>
           </a:p>
@@ -461,7 +468,7 @@
           <a:p>
             <a:fld id="{2638AAA8-BCC5-4F10-BE49-E27B80A547D2}" type="datetimeFigureOut">
               <a:rPr lang="en-US" smtClean="0"/>
-              <a:t>3/18/2020</a:t>
+              <a:t>2/13/2021</a:t>
             </a:fld>
             <a:endParaRPr lang="en-US"/>
           </a:p>
@@ -671,7 +678,7 @@
           <a:p>
             <a:fld id="{2638AAA8-BCC5-4F10-BE49-E27B80A547D2}" type="datetimeFigureOut">
               <a:rPr lang="en-US" smtClean="0"/>
-              <a:t>3/18/2020</a:t>
+              <a:t>2/13/2021</a:t>
             </a:fld>
             <a:endParaRPr lang="en-US"/>
           </a:p>
@@ -871,7 +878,7 @@
           <a:p>
             <a:fld id="{2638AAA8-BCC5-4F10-BE49-E27B80A547D2}" type="datetimeFigureOut">
               <a:rPr lang="en-US" smtClean="0"/>
-              <a:t>3/18/2020</a:t>
+              <a:t>2/13/2021</a:t>
             </a:fld>
             <a:endParaRPr lang="en-US"/>
           </a:p>
@@ -1147,7 +1154,7 @@
           <a:p>
             <a:fld id="{2638AAA8-BCC5-4F10-BE49-E27B80A547D2}" type="datetimeFigureOut">
               <a:rPr lang="en-US" smtClean="0"/>
-              <a:t>3/18/2020</a:t>
+              <a:t>2/13/2021</a:t>
             </a:fld>
             <a:endParaRPr lang="en-US"/>
           </a:p>
@@ -1415,7 +1422,7 @@
           <a:p>
             <a:fld id="{2638AAA8-BCC5-4F10-BE49-E27B80A547D2}" type="datetimeFigureOut">
               <a:rPr lang="en-US" smtClean="0"/>
-              <a:t>3/18/2020</a:t>
+              <a:t>2/13/2021</a:t>
             </a:fld>
             <a:endParaRPr lang="en-US"/>
           </a:p>
@@ -1830,7 +1837,7 @@
           <a:p>
             <a:fld id="{2638AAA8-BCC5-4F10-BE49-E27B80A547D2}" type="datetimeFigureOut">
               <a:rPr lang="en-US" smtClean="0"/>
-              <a:t>3/18/2020</a:t>
+              <a:t>2/13/2021</a:t>
             </a:fld>
             <a:endParaRPr lang="en-US"/>
           </a:p>
@@ -1972,7 +1979,7 @@
           <a:p>
             <a:fld id="{2638AAA8-BCC5-4F10-BE49-E27B80A547D2}" type="datetimeFigureOut">
               <a:rPr lang="en-US" smtClean="0"/>
-              <a:t>3/18/2020</a:t>
+              <a:t>2/13/2021</a:t>
             </a:fld>
             <a:endParaRPr lang="en-US"/>
           </a:p>
@@ -2085,7 +2092,7 @@
           <a:p>
             <a:fld id="{2638AAA8-BCC5-4F10-BE49-E27B80A547D2}" type="datetimeFigureOut">
               <a:rPr lang="en-US" smtClean="0"/>
-              <a:t>3/18/2020</a:t>
+              <a:t>2/13/2021</a:t>
             </a:fld>
             <a:endParaRPr lang="en-US"/>
           </a:p>
@@ -2398,7 +2405,7 @@
           <a:p>
             <a:fld id="{2638AAA8-BCC5-4F10-BE49-E27B80A547D2}" type="datetimeFigureOut">
               <a:rPr lang="en-US" smtClean="0"/>
-              <a:t>3/18/2020</a:t>
+              <a:t>2/13/2021</a:t>
             </a:fld>
             <a:endParaRPr lang="en-US"/>
           </a:p>
@@ -2687,7 +2694,7 @@
           <a:p>
             <a:fld id="{2638AAA8-BCC5-4F10-BE49-E27B80A547D2}" type="datetimeFigureOut">
               <a:rPr lang="en-US" smtClean="0"/>
-              <a:t>3/18/2020</a:t>
+              <a:t>2/13/2021</a:t>
             </a:fld>
             <a:endParaRPr lang="en-US"/>
           </a:p>
@@ -2930,7 +2937,7 @@
           <a:p>
             <a:fld id="{2638AAA8-BCC5-4F10-BE49-E27B80A547D2}" type="datetimeFigureOut">
               <a:rPr lang="en-US" smtClean="0"/>
-              <a:t>3/18/2020</a:t>
+              <a:t>2/13/2021</a:t>
             </a:fld>
             <a:endParaRPr lang="en-US"/>
           </a:p>

</xml_diff>